<commit_message>
Working on Differences between List vs Dictionary
</commit_message>
<xml_diff>
--- a/Slides/4. Datatypes/Collections/Generic Collection/Dictionary.pptx
+++ b/Slides/4. Datatypes/Collections/Generic Collection/Dictionary.pptx
@@ -5,7 +5,7 @@
     <p:sldMasterId id="2147483648" r:id="rId1"/>
   </p:sldMasterIdLst>
   <p:notesMasterIdLst>
-    <p:notesMasterId r:id="rId17"/>
+    <p:notesMasterId r:id="rId18"/>
   </p:notesMasterIdLst>
   <p:sldIdLst>
     <p:sldId id="257" r:id="rId2"/>
@@ -23,6 +23,7 @@
     <p:sldId id="357" r:id="rId14"/>
     <p:sldId id="358" r:id="rId15"/>
     <p:sldId id="359" r:id="rId16"/>
+    <p:sldId id="360" r:id="rId17"/>
   </p:sldIdLst>
   <p:sldSz cx="12192000" cy="6858000"/>
   <p:notesSz cx="6858000" cy="9144000"/>
@@ -121,6 +122,11 @@
       </a:defRPr>
     </a:lvl9pPr>
   </p:defaultTextStyle>
+  <p:extLst>
+    <p:ext uri="{EFAFB233-063F-42B5-8137-9DF3F51BA10A}">
+      <p15:sldGuideLst xmlns:p15="http://schemas.microsoft.com/office/powerpoint/2012/main"/>
+    </p:ext>
+  </p:extLst>
 </p:presentation>
 </file>
 
@@ -28092,6 +28098,198 @@
 </p:sld>
 </file>
 
+<file path=ppt/slides/slide16.xml><?xml version="1.0" encoding="utf-8"?>
+<p:sld xmlns:a="http://schemas.openxmlformats.org/drawingml/2006/main" xmlns:r="http://schemas.openxmlformats.org/officeDocument/2006/relationships" xmlns:p="http://schemas.openxmlformats.org/presentationml/2006/main">
+  <p:cSld>
+    <p:spTree>
+      <p:nvGrpSpPr>
+        <p:cNvPr id="1" name=""/>
+        <p:cNvGrpSpPr/>
+        <p:nvPr/>
+      </p:nvGrpSpPr>
+      <p:grpSpPr>
+        <a:xfrm>
+          <a:off x="0" y="0"/>
+          <a:ext cx="0" cy="0"/>
+          <a:chOff x="0" y="0"/>
+          <a:chExt cx="0" cy="0"/>
+        </a:xfrm>
+      </p:grpSpPr>
+      <p:sp>
+        <p:nvSpPr>
+          <p:cNvPr id="2" name="Title 1">
+            <a:extLst>
+              <a:ext uri="{FF2B5EF4-FFF2-40B4-BE49-F238E27FC236}">
+                <a16:creationId xmlns:a16="http://schemas.microsoft.com/office/drawing/2014/main" id="{9D926704-E51D-3A42-3DE2-BF2074D1AC51}"/>
+              </a:ext>
+            </a:extLst>
+          </p:cNvPr>
+          <p:cNvSpPr>
+            <a:spLocks noGrp="1"/>
+          </p:cNvSpPr>
+          <p:nvPr>
+            <p:ph type="title"/>
+          </p:nvPr>
+        </p:nvSpPr>
+        <p:spPr>
+          <a:xfrm>
+            <a:off x="693336" y="341644"/>
+            <a:ext cx="10078496" cy="693336"/>
+          </a:xfrm>
+        </p:spPr>
+        <p:txBody>
+          <a:bodyPr/>
+          <a:lstStyle/>
+          <a:p>
+            <a:r>
+              <a:rPr lang="en-US" dirty="0"/>
+              <a:t>Conversion to and From Dictionary</a:t>
+            </a:r>
+          </a:p>
+        </p:txBody>
+      </p:sp>
+      <p:sp>
+        <p:nvSpPr>
+          <p:cNvPr id="3" name="Text Placeholder 2">
+            <a:extLst>
+              <a:ext uri="{FF2B5EF4-FFF2-40B4-BE49-F238E27FC236}">
+                <a16:creationId xmlns:a16="http://schemas.microsoft.com/office/drawing/2014/main" id="{2AED27AF-6034-F9FE-441F-26BC08771C9B}"/>
+              </a:ext>
+            </a:extLst>
+          </p:cNvPr>
+          <p:cNvSpPr>
+            <a:spLocks noGrp="1"/>
+          </p:cNvSpPr>
+          <p:nvPr>
+            <p:ph type="body" idx="1"/>
+          </p:nvPr>
+        </p:nvSpPr>
+        <p:spPr>
+          <a:xfrm>
+            <a:off x="582804" y="1034981"/>
+            <a:ext cx="10999596" cy="5147220"/>
+          </a:xfrm>
+        </p:spPr>
+        <p:txBody>
+          <a:bodyPr/>
+          <a:lstStyle/>
+          <a:p>
+            <a:pPr marL="152396" indent="0">
+              <a:buNone/>
+            </a:pPr>
+            <a:r>
+              <a:rPr lang="en-US" dirty="0"/>
+              <a:t>Convert an array to a List – Use </a:t>
+            </a:r>
+            <a:r>
+              <a:rPr lang="en-US" dirty="0" err="1"/>
+              <a:t>ToList</a:t>
+            </a:r>
+            <a:r>
+              <a:rPr lang="en-US" dirty="0"/>
+              <a:t>() method</a:t>
+            </a:r>
+          </a:p>
+          <a:p>
+            <a:pPr marL="152396" indent="0">
+              <a:buNone/>
+            </a:pPr>
+            <a:r>
+              <a:rPr lang="en-US" dirty="0"/>
+              <a:t>Convert a list to an array – Use </a:t>
+            </a:r>
+            <a:r>
+              <a:rPr lang="en-US" dirty="0" err="1"/>
+              <a:t>ToArray</a:t>
+            </a:r>
+            <a:r>
+              <a:rPr lang="en-US" dirty="0"/>
+              <a:t>() method</a:t>
+            </a:r>
+          </a:p>
+          <a:p>
+            <a:pPr marL="152396" indent="0">
+              <a:buNone/>
+            </a:pPr>
+            <a:r>
+              <a:rPr lang="en-US" dirty="0"/>
+              <a:t>Convert a List to a Dictionary – Use </a:t>
+            </a:r>
+            <a:r>
+              <a:rPr lang="en-US" dirty="0" err="1"/>
+              <a:t>ToDictionary</a:t>
+            </a:r>
+            <a:r>
+              <a:rPr lang="en-US" dirty="0"/>
+              <a:t>() method</a:t>
+            </a:r>
+          </a:p>
+          <a:p>
+            <a:pPr marL="152396" indent="0">
+              <a:buNone/>
+            </a:pPr>
+            <a:r>
+              <a:rPr lang="en-US" dirty="0"/>
+              <a:t>Convert an array to a Dictionary – Use </a:t>
+            </a:r>
+            <a:r>
+              <a:rPr lang="en-US" dirty="0" err="1"/>
+              <a:t>ToDictionary</a:t>
+            </a:r>
+            <a:r>
+              <a:rPr lang="en-US" dirty="0"/>
+              <a:t>() method</a:t>
+            </a:r>
+          </a:p>
+          <a:p>
+            <a:pPr marL="152396" indent="0">
+              <a:buNone/>
+            </a:pPr>
+            <a:r>
+              <a:rPr lang="en-US" dirty="0"/>
+              <a:t>Convert a Dictionary to an array – Use </a:t>
+            </a:r>
+            <a:r>
+              <a:rPr lang="en-US" dirty="0" err="1"/>
+              <a:t>ToArray</a:t>
+            </a:r>
+            <a:r>
+              <a:rPr lang="en-US" dirty="0"/>
+              <a:t>() method on the Values Property of the dictionary object</a:t>
+            </a:r>
+          </a:p>
+          <a:p>
+            <a:pPr marL="152396" indent="0">
+              <a:buNone/>
+            </a:pPr>
+            <a:r>
+              <a:rPr lang="en-US" dirty="0"/>
+              <a:t>Convert a Dictionary to a List – Use the </a:t>
+            </a:r>
+            <a:r>
+              <a:rPr lang="en-US" dirty="0" err="1"/>
+              <a:t>ToList</a:t>
+            </a:r>
+            <a:r>
+              <a:rPr lang="en-US" dirty="0"/>
+              <a:t>() method on the Values Property of the dictionary object</a:t>
+            </a:r>
+          </a:p>
+        </p:txBody>
+      </p:sp>
+    </p:spTree>
+    <p:extLst>
+      <p:ext uri="{BB962C8B-B14F-4D97-AF65-F5344CB8AC3E}">
+        <p14:creationId xmlns:p14="http://schemas.microsoft.com/office/powerpoint/2010/main" val="1179944151"/>
+      </p:ext>
+    </p:extLst>
+  </p:cSld>
+  <p:clrMapOvr>
+    <a:masterClrMapping/>
+  </p:clrMapOvr>
+</p:sld>
+</file>
+
 <file path=ppt/slides/slide2.xml><?xml version="1.0" encoding="utf-8"?>
 <p:sld xmlns:a="http://schemas.openxmlformats.org/drawingml/2006/main" xmlns:r="http://schemas.openxmlformats.org/officeDocument/2006/relationships" xmlns:p="http://schemas.openxmlformats.org/presentationml/2006/main">
   <p:cSld>

</xml_diff>